<commit_message>
Update Testing2 for ECP AM
</commit_message>
<xml_diff>
--- a/final-presentations/2021-04-12-ecpam/03-testing2.pptx
+++ b/final-presentations/2021-04-12-ecpam/03-testing2.pptx
@@ -12,7 +12,7 @@
   </p:handoutMasterIdLst>
   <p:sldIdLst>
     <p:sldId id="631" r:id="rId5"/>
-    <p:sldId id="320" r:id="rId6"/>
+    <p:sldId id="633" r:id="rId6"/>
     <p:sldId id="487" r:id="rId7"/>
     <p:sldId id="632" r:id="rId8"/>
     <p:sldId id="579" r:id="rId9"/>
@@ -25,7 +25,7 @@
     <p:sldId id="586" r:id="rId16"/>
     <p:sldId id="465" r:id="rId17"/>
     <p:sldId id="571" r:id="rId18"/>
-    <p:sldId id="265" r:id="rId19"/>
+    <p:sldId id="262" r:id="rId19"/>
   </p:sldIdLst>
   <p:sldSz cx="12188825" cy="6858000"/>
   <p:notesSz cx="7010400" cy="9296400"/>
@@ -269,7 +269,7 @@
           <a:p>
             <a:fld id="{0B842F42-2CE9-4E35-95C1-410DC08A50B1}" type="datetimeFigureOut">
               <a:rPr lang="en-US" smtClean="0"/>
-              <a:t>4/6/21</a:t>
+              <a:t>4/10/2021</a:t>
             </a:fld>
             <a:endParaRPr lang="en-US"/>
           </a:p>
@@ -434,7 +434,7 @@
           <a:p>
             <a:fld id="{6F282904-F315-4730-8D91-37D99E141A6F}" type="datetimeFigureOut">
               <a:rPr lang="en-US" smtClean="0"/>
-              <a:t>4/6/21</a:t>
+              <a:t>4/10/2021</a:t>
             </a:fld>
             <a:endParaRPr lang="en-US"/>
           </a:p>
@@ -4675,7 +4675,7 @@
           <a:noFill/>
           <a:extLst>
             <a:ext uri="{909E8E84-426E-40dd-AFC4-6F175D3DCCD1}">
-              <a14:hiddenFill xmlns="" xmlns:a14="http://schemas.microsoft.com/office/drawing/2010/main">
+              <a14:hiddenFill xmlns:a14="http://schemas.microsoft.com/office/drawing/2010/main" xmlns="">
                 <a:solidFill>
                   <a:srgbClr val="FFFFFF"/>
                 </a:solidFill>
@@ -4829,7 +4829,7 @@
           <a:noFill/>
           <a:extLst>
             <a:ext uri="{909E8E84-426E-40dd-AFC4-6F175D3DCCD1}">
-              <a14:hiddenFill xmlns="" xmlns:a14="http://schemas.microsoft.com/office/drawing/2010/main">
+              <a14:hiddenFill xmlns:a14="http://schemas.microsoft.com/office/drawing/2010/main" xmlns="">
                 <a:solidFill>
                   <a:srgbClr val="FFFFFF"/>
                 </a:solidFill>
@@ -8496,7 +8496,15 @@
                   <a:srgbClr val="000000"/>
                 </a:solidFill>
               </a:rPr>
-              <a:t>David M. Rogers</a:t>
+              <a:t>David E. Bernholdt</a:t>
+            </a:r>
+            <a:r>
+              <a:rPr lang="en-US" dirty="0">
+                <a:solidFill>
+                  <a:srgbClr val="000000"/>
+                </a:solidFill>
+              </a:rPr>
+              <a:t>, David M. Rogers</a:t>
             </a:r>
             <a:br>
               <a:rPr lang="en-US" dirty="0">
@@ -8558,60 +8566,10 @@
             </a:r>
           </a:p>
           <a:p>
-            <a:pPr>
-              <a:lnSpc>
-                <a:spcPct val="100000"/>
-              </a:lnSpc>
-              <a:buSzPts val="2000"/>
-            </a:pPr>
-            <a:r>
-              <a:rPr lang="en-US" dirty="0"/>
-              <a:t>Better Scientific Software Tutorial, ISS, March 2021</a:t>
-            </a:r>
-            <a:endParaRPr lang="en-US" sz="1400" dirty="0"/>
-          </a:p>
-          <a:p>
-            <a:pPr marL="0" indent="0">
-              <a:lnSpc>
-                <a:spcPct val="100000"/>
-              </a:lnSpc>
-              <a:spcBef>
-                <a:spcPts val="0"/>
-              </a:spcBef>
-              <a:buSzPts val="2000"/>
-            </a:pPr>
-            <a:endParaRPr lang="en-US" sz="1400" dirty="0"/>
-          </a:p>
-          <a:p>
-            <a:pPr marL="0" lvl="0" indent="0" algn="l" rtl="0">
-              <a:lnSpc>
-                <a:spcPct val="90000"/>
-              </a:lnSpc>
-              <a:spcBef>
-                <a:spcPts val="1400"/>
-              </a:spcBef>
-              <a:spcAft>
-                <a:spcPts val="0"/>
-              </a:spcAft>
-              <a:buSzPts val="2000"/>
-              <a:buNone/>
-            </a:pPr>
-            <a:endParaRPr sz="1400" dirty="0"/>
-          </a:p>
-          <a:p>
-            <a:pPr marL="0" lvl="0" indent="0" algn="l" rtl="0">
-              <a:lnSpc>
-                <a:spcPct val="90000"/>
-              </a:lnSpc>
-              <a:spcBef>
-                <a:spcPts val="1400"/>
-              </a:spcBef>
-              <a:spcAft>
-                <a:spcPts val="0"/>
-              </a:spcAft>
-              <a:buSzPts val="2000"/>
-              <a:buNone/>
-            </a:pPr>
+            <a:r>
+              <a:rPr lang="en-US" sz="2000" dirty="0"/>
+              <a:t>Developing a Testing and Continuous Integration Strategy for your Team tutorial @ ECP Annual Meeting, April 2021</a:t>
+            </a:r>
             <a:endParaRPr dirty="0">
               <a:solidFill>
                 <a:srgbClr val="000000"/>
@@ -13104,7 +13062,7 @@
         </p:nvGraphicFramePr>
         <p:xfrm>
           <a:off x="1055369" y="916940"/>
-          <a:ext cx="10078086" cy="5024120"/>
+          <a:ext cx="10042603" cy="2778760"/>
         </p:xfrm>
         <a:graphic>
           <a:graphicData uri="http://schemas.openxmlformats.org/drawingml/2006/table">
@@ -13113,7 +13071,7 @@
                 <a:tableStyleId>{5C22544A-7EE6-4342-B048-85BDC9FD1C3A}</a:tableStyleId>
               </a:tblPr>
               <a:tblGrid>
-                <a:gridCol w="1826183">
+                <a:gridCol w="1790700">
                   <a:extLst>
                     <a:ext uri="{9D8B030D-6E8A-4147-A177-3AD203B41FA5}">
                       <a16:colId xmlns:a16="http://schemas.microsoft.com/office/drawing/2014/main" val="3446576009"/>
@@ -13157,7 +13115,7 @@
                         <a:rPr lang="en-US" sz="1800" dirty="0">
                           <a:latin typeface="+mn-lt"/>
                         </a:rPr>
-                        <a:t>Time (MDT)</a:t>
+                        <a:t>Time (EDT)</a:t>
                       </a:r>
                     </a:p>
                   </a:txBody>
@@ -13251,7 +13209,7 @@
                           <a:effectLst/>
                           <a:latin typeface="+mn-lt"/>
                         </a:rPr>
-                        <a:t>1:00pm-1:05pm</a:t>
+                        <a:t>2:30-2:35pm</a:t>
                       </a:r>
                       <a:endParaRPr lang="en-US" sz="1800" dirty="0">
                         <a:effectLst/>
@@ -13358,7 +13316,7 @@
                           <a:effectLst/>
                           <a:latin typeface="+mn-lt"/>
                         </a:rPr>
-                        <a:t>1:05pm-1:15pm</a:t>
+                        <a:t>2:35pm-2:40pm</a:t>
                       </a:r>
                       <a:endParaRPr lang="en-US" sz="1800" dirty="0">
                         <a:effectLst/>
@@ -13432,7 +13390,7 @@
                           <a:ea typeface="+mn-ea"/>
                           <a:cs typeface="+mn-cs"/>
                         </a:rPr>
-                        <a:t>Motivation and Overview of Best Practices in HPC Software Development</a:t>
+                        <a:t>Motivation and Overview</a:t>
                       </a:r>
                       <a:endParaRPr lang="en-US" sz="1800" dirty="0">
                         <a:latin typeface="+mn-lt"/>
@@ -13467,7 +13425,7 @@
                         <a:rPr lang="en-US" sz="1800" dirty="0">
                           <a:latin typeface="+mn-lt"/>
                         </a:rPr>
-                        <a:t>David E. Bernholdt, ORNL</a:t>
+                        <a:t>Patricia A. Grubel, LANL</a:t>
                       </a:r>
                     </a:p>
                   </a:txBody>
@@ -13496,225 +13454,12 @@
                       <a:r>
                         <a:rPr lang="en-US" sz="1800" b="0" i="0" u="none" strike="noStrike" dirty="0">
                           <a:solidFill>
-                            <a:srgbClr val="000000"/>
-                          </a:solidFill>
-                          <a:effectLst/>
-                          <a:latin typeface="+mn-lt"/>
-                        </a:rPr>
-                        <a:t>1:15pm-1:45pm</a:t>
-                      </a:r>
-                      <a:endParaRPr lang="en-US" sz="1800" dirty="0">
-                        <a:effectLst/>
-                        <a:latin typeface="+mn-lt"/>
-                      </a:endParaRPr>
-                    </a:p>
-                  </a:txBody>
-                  <a:tcPr marL="63500" marR="63500" marT="63500" marB="63500"/>
-                </a:tc>
-                <a:tc>
-                  <a:txBody>
-                    <a:bodyPr/>
-                    <a:lstStyle/>
-                    <a:p>
-                      <a:pPr>
-                        <a:lnSpc>
-                          <a:spcPct val="100000"/>
-                        </a:lnSpc>
-                      </a:pPr>
-                      <a:r>
-                        <a:rPr lang="en-US" sz="1800" dirty="0">
-                          <a:latin typeface="+mn-lt"/>
-                        </a:rPr>
-                        <a:t>02</a:t>
-                      </a:r>
-                    </a:p>
-                  </a:txBody>
-                  <a:tcPr/>
-                </a:tc>
-                <a:tc>
-                  <a:txBody>
-                    <a:bodyPr/>
-                    <a:lstStyle/>
-                    <a:p>
-                      <a:pPr>
-                        <a:lnSpc>
-                          <a:spcPct val="100000"/>
-                        </a:lnSpc>
-                      </a:pPr>
-                      <a:r>
-                        <a:rPr lang="en-US" sz="1800" dirty="0">
-                          <a:latin typeface="+mn-lt"/>
-                        </a:rPr>
-                        <a:t>Agile Methodologies</a:t>
-                      </a:r>
-                    </a:p>
-                  </a:txBody>
-                  <a:tcPr/>
-                </a:tc>
-                <a:tc>
-                  <a:txBody>
-                    <a:bodyPr/>
-                    <a:lstStyle/>
-                    <a:p>
-                      <a:pPr>
-                        <a:lnSpc>
-                          <a:spcPct val="100000"/>
-                        </a:lnSpc>
-                      </a:pPr>
-                      <a:r>
-                        <a:rPr lang="en-US" sz="1800" dirty="0">
-                          <a:latin typeface="+mn-lt"/>
-                        </a:rPr>
-                        <a:t>Rinku K. Gupta, ANL</a:t>
-                      </a:r>
-                    </a:p>
-                  </a:txBody>
-                  <a:tcPr/>
-                </a:tc>
-                <a:extLst>
-                  <a:ext uri="{0D108BD9-81ED-4DB2-BD59-A6C34878D82A}">
-                    <a16:rowId xmlns:a16="http://schemas.microsoft.com/office/drawing/2014/main" val="3991164013"/>
-                  </a:ext>
-                </a:extLst>
-              </a:tr>
-              <a:tr h="370840">
-                <a:tc>
-                  <a:txBody>
-                    <a:bodyPr/>
-                    <a:lstStyle/>
-                    <a:p>
-                      <a:pPr rtl="0" fontAlgn="t">
-                        <a:spcBef>
-                          <a:spcPts val="0"/>
-                        </a:spcBef>
-                        <a:spcAft>
-                          <a:spcPts val="0"/>
-                        </a:spcAft>
-                      </a:pPr>
-                      <a:r>
-                        <a:rPr lang="en-US" sz="1800" dirty="0">
-                          <a:effectLst/>
-                          <a:latin typeface="+mn-lt"/>
-                        </a:rPr>
-                        <a:t>1:45pm-2:00pm</a:t>
-                      </a:r>
-                    </a:p>
-                  </a:txBody>
-                  <a:tcPr marL="63500" marR="63500" marT="63500" marB="63500"/>
-                </a:tc>
-                <a:tc>
-                  <a:txBody>
-                    <a:bodyPr/>
-                    <a:lstStyle/>
-                    <a:p>
-                      <a:pPr>
-                        <a:lnSpc>
-                          <a:spcPct val="100000"/>
-                        </a:lnSpc>
-                      </a:pPr>
-                      <a:r>
-                        <a:rPr lang="en-US" sz="1800" i="0" dirty="0">
-                          <a:solidFill>
-                            <a:schemeClr val="tx1"/>
-                          </a:solidFill>
-                          <a:latin typeface="+mn-lt"/>
-                        </a:rPr>
-                        <a:t>03</a:t>
-                      </a:r>
-                    </a:p>
-                  </a:txBody>
-                  <a:tcPr/>
-                </a:tc>
-                <a:tc>
-                  <a:txBody>
-                    <a:bodyPr/>
-                    <a:lstStyle/>
-                    <a:p>
-                      <a:pPr marL="0" marR="0" lvl="0" indent="0" algn="l" defTabSz="914400" rtl="0" eaLnBrk="1" fontAlgn="auto" latinLnBrk="0" hangingPunct="1">
-                        <a:lnSpc>
-                          <a:spcPct val="100000"/>
-                        </a:lnSpc>
-                        <a:spcBef>
-                          <a:spcPts val="0"/>
-                        </a:spcBef>
-                        <a:spcAft>
-                          <a:spcPts val="0"/>
-                        </a:spcAft>
-                        <a:buClrTx/>
-                        <a:buSzTx/>
-                        <a:buFontTx/>
-                        <a:buNone/>
-                        <a:tabLst/>
-                        <a:defRPr/>
-                      </a:pPr>
-                      <a:r>
-                        <a:rPr lang="en-US" sz="1800" b="0" i="0" u="none" strike="noStrike" kern="1200" dirty="0">
-                          <a:solidFill>
-                            <a:schemeClr val="dk1"/>
-                          </a:solidFill>
-                          <a:effectLst/>
-                          <a:latin typeface="+mn-lt"/>
-                          <a:ea typeface="+mn-ea"/>
-                          <a:cs typeface="+mn-cs"/>
-                        </a:rPr>
-                        <a:t>Git Workflows</a:t>
-                      </a:r>
-                      <a:endParaRPr lang="en-US" sz="1800" dirty="0">
-                        <a:latin typeface="+mn-lt"/>
-                      </a:endParaRPr>
-                    </a:p>
-                  </a:txBody>
-                  <a:tcPr/>
-                </a:tc>
-                <a:tc>
-                  <a:txBody>
-                    <a:bodyPr/>
-                    <a:lstStyle/>
-                    <a:p>
-                      <a:pPr>
-                        <a:lnSpc>
-                          <a:spcPct val="100000"/>
-                        </a:lnSpc>
-                      </a:pPr>
-                      <a:r>
-                        <a:rPr lang="en-US" sz="1800" dirty="0">
-                          <a:latin typeface="+mn-lt"/>
-                        </a:rPr>
-                        <a:t>Rinku K. Gupta, ANL</a:t>
-                      </a:r>
-                    </a:p>
-                  </a:txBody>
-                  <a:tcPr/>
-                </a:tc>
-                <a:extLst>
-                  <a:ext uri="{0D108BD9-81ED-4DB2-BD59-A6C34878D82A}">
-                    <a16:rowId xmlns:a16="http://schemas.microsoft.com/office/drawing/2014/main" val="1350023114"/>
-                  </a:ext>
-                </a:extLst>
-              </a:tr>
-              <a:tr h="370840">
-                <a:tc>
-                  <a:txBody>
-                    <a:bodyPr/>
-                    <a:lstStyle/>
-                    <a:p>
-                      <a:pPr rtl="0" fontAlgn="t">
-                        <a:spcBef>
-                          <a:spcPts val="0"/>
-                        </a:spcBef>
-                        <a:spcAft>
-                          <a:spcPts val="0"/>
-                        </a:spcAft>
-                      </a:pPr>
-                      <a:r>
-                        <a:rPr lang="en-US" sz="1800" b="0" i="0" u="none" strike="noStrike" dirty="0">
-                          <a:solidFill>
                             <a:schemeClr val="tx1"/>
                           </a:solidFill>
                           <a:effectLst/>
                           <a:latin typeface="+mn-lt"/>
                         </a:rPr>
-                        <a:t>2:00pm-2:20pm</a:t>
+                        <a:t>2:40pm-3:00pm</a:t>
                       </a:r>
                       <a:endParaRPr lang="en-US" sz="1800" i="0" dirty="0">
                         <a:solidFill>
@@ -13744,7 +13489,7 @@
                           </a:solidFill>
                           <a:latin typeface="+mn-lt"/>
                         </a:rPr>
-                        <a:t>04</a:t>
+                        <a:t>02</a:t>
                       </a:r>
                     </a:p>
                   </a:txBody>
@@ -13790,19 +13535,28 @@
                     <a:bodyPr/>
                     <a:lstStyle/>
                     <a:p>
-                      <a:pPr>
+                      <a:pPr marL="0" marR="0" lvl="0" indent="0" algn="l" defTabSz="914400" rtl="0" eaLnBrk="1" fontAlgn="auto" latinLnBrk="0" hangingPunct="1">
                         <a:lnSpc>
                           <a:spcPct val="100000"/>
                         </a:lnSpc>
+                        <a:spcBef>
+                          <a:spcPts val="0"/>
+                        </a:spcBef>
+                        <a:spcAft>
+                          <a:spcPts val="0"/>
+                        </a:spcAft>
+                        <a:buClrTx/>
+                        <a:buSzTx/>
+                        <a:buFontTx/>
+                        <a:buNone/>
+                        <a:tabLst/>
+                        <a:defRPr/>
                       </a:pPr>
                       <a:r>
-                        <a:rPr lang="en-US" sz="1800" i="0" dirty="0">
-                          <a:solidFill>
-                            <a:schemeClr val="tx1"/>
-                          </a:solidFill>
+                        <a:rPr lang="en-US" sz="1800" dirty="0">
                           <a:latin typeface="+mn-lt"/>
                         </a:rPr>
-                        <a:t>David M. Rogers, ORNL</a:t>
+                        <a:t>Patricia A. Grubel, LANL</a:t>
                       </a:r>
                     </a:p>
                   </a:txBody>
@@ -13829,234 +13583,11 @@
                         </a:spcAft>
                       </a:pPr>
                       <a:r>
-                        <a:rPr lang="en-US" sz="1800" b="0" i="1" u="none" strike="noStrike" dirty="0">
-                          <a:solidFill>
-                            <a:schemeClr val="tx2"/>
-                          </a:solidFill>
-                          <a:effectLst/>
-                          <a:latin typeface="+mn-lt"/>
-                        </a:rPr>
-                        <a:t>2:20pm-2:40pm</a:t>
-                      </a:r>
-                      <a:endParaRPr lang="en-US" sz="1800" i="1" dirty="0">
-                        <a:solidFill>
-                          <a:schemeClr val="tx2"/>
-                        </a:solidFill>
-                        <a:effectLst/>
-                        <a:latin typeface="+mn-lt"/>
-                      </a:endParaRPr>
-                    </a:p>
-                  </a:txBody>
-                  <a:tcPr marL="63500" marR="63500" marT="63500" marB="63500"/>
-                </a:tc>
-                <a:tc>
-                  <a:txBody>
-                    <a:bodyPr/>
-                    <a:lstStyle/>
-                    <a:p>
-                      <a:pPr>
-                        <a:lnSpc>
-                          <a:spcPct val="100000"/>
-                        </a:lnSpc>
-                      </a:pPr>
-                      <a:endParaRPr lang="en-US" sz="1800" i="1" dirty="0">
-                        <a:solidFill>
-                          <a:schemeClr val="tx2"/>
-                        </a:solidFill>
-                        <a:latin typeface="+mn-lt"/>
-                      </a:endParaRPr>
-                    </a:p>
-                  </a:txBody>
-                  <a:tcPr/>
-                </a:tc>
-                <a:tc>
-                  <a:txBody>
-                    <a:bodyPr/>
-                    <a:lstStyle/>
-                    <a:p>
-                      <a:pPr>
-                        <a:lnSpc>
-                          <a:spcPct val="100000"/>
-                        </a:lnSpc>
-                      </a:pPr>
-                      <a:r>
-                        <a:rPr lang="en-US" sz="1800" i="1" dirty="0">
-                          <a:solidFill>
-                            <a:schemeClr val="tx2"/>
-                          </a:solidFill>
-                          <a:latin typeface="+mn-lt"/>
-                        </a:rPr>
-                        <a:t>Break (optional Q&amp;A)</a:t>
-                      </a:r>
-                    </a:p>
-                  </a:txBody>
-                  <a:tcPr/>
-                </a:tc>
-                <a:tc>
-                  <a:txBody>
-                    <a:bodyPr/>
-                    <a:lstStyle/>
-                    <a:p>
-                      <a:pPr>
-                        <a:lnSpc>
-                          <a:spcPct val="100000"/>
-                        </a:lnSpc>
-                      </a:pPr>
-                      <a:r>
-                        <a:rPr lang="en-US" sz="1800" i="1" dirty="0">
-                          <a:solidFill>
-                            <a:schemeClr val="tx2"/>
-                          </a:solidFill>
-                          <a:latin typeface="+mn-lt"/>
-                        </a:rPr>
-                        <a:t>All</a:t>
-                      </a:r>
-                    </a:p>
-                  </a:txBody>
-                  <a:tcPr/>
-                </a:tc>
-                <a:extLst>
-                  <a:ext uri="{0D108BD9-81ED-4DB2-BD59-A6C34878D82A}">
-                    <a16:rowId xmlns:a16="http://schemas.microsoft.com/office/drawing/2014/main" val="4193880066"/>
-                  </a:ext>
-                </a:extLst>
-              </a:tr>
-              <a:tr h="370840">
-                <a:tc>
-                  <a:txBody>
-                    <a:bodyPr/>
-                    <a:lstStyle/>
-                    <a:p>
-                      <a:pPr rtl="0" fontAlgn="t">
-                        <a:spcBef>
-                          <a:spcPts val="0"/>
-                        </a:spcBef>
-                        <a:spcAft>
-                          <a:spcPts val="0"/>
-                        </a:spcAft>
-                      </a:pPr>
-                      <a:r>
-                        <a:rPr lang="en-US" sz="1800" b="0" i="0" u="none" strike="noStrike" dirty="0">
-                          <a:solidFill>
-                            <a:srgbClr val="000000"/>
-                          </a:solidFill>
-                          <a:effectLst/>
-                          <a:latin typeface="+mn-lt"/>
-                        </a:rPr>
-                        <a:t>2:40pm-3:00pm</a:t>
-                      </a:r>
-                      <a:endParaRPr lang="en-US" sz="1800" dirty="0">
-                        <a:effectLst/>
-                        <a:latin typeface="+mn-lt"/>
-                      </a:endParaRPr>
-                    </a:p>
-                  </a:txBody>
-                  <a:tcPr marL="63500" marR="63500" marT="63500" marB="63500"/>
-                </a:tc>
-                <a:tc>
-                  <a:txBody>
-                    <a:bodyPr/>
-                    <a:lstStyle/>
-                    <a:p>
-                      <a:pPr>
-                        <a:lnSpc>
-                          <a:spcPct val="100000"/>
-                        </a:lnSpc>
-                      </a:pPr>
-                      <a:r>
-                        <a:rPr lang="en-US" sz="1800" i="0" dirty="0">
-                          <a:latin typeface="+mn-lt"/>
-                        </a:rPr>
-                        <a:t>05</a:t>
-                      </a:r>
-                    </a:p>
-                  </a:txBody>
-                  <a:tcPr/>
-                </a:tc>
-                <a:tc>
-                  <a:txBody>
-                    <a:bodyPr/>
-                    <a:lstStyle/>
-                    <a:p>
-                      <a:pPr marL="0" marR="0" lvl="0" indent="0" algn="l" defTabSz="914400" rtl="0" eaLnBrk="1" fontAlgn="auto" latinLnBrk="0" hangingPunct="1">
-                        <a:lnSpc>
-                          <a:spcPct val="100000"/>
-                        </a:lnSpc>
-                        <a:spcBef>
-                          <a:spcPts val="0"/>
-                        </a:spcBef>
-                        <a:spcAft>
-                          <a:spcPts val="0"/>
-                        </a:spcAft>
-                        <a:buClrTx/>
-                        <a:buSzTx/>
-                        <a:buFontTx/>
-                        <a:buNone/>
-                        <a:tabLst/>
-                        <a:defRPr/>
-                      </a:pPr>
-                      <a:r>
-                        <a:rPr lang="en-US" sz="1800" b="0" i="0" u="none" strike="noStrike" kern="1200" dirty="0">
-                          <a:solidFill>
-                            <a:schemeClr val="tx1"/>
-                          </a:solidFill>
-                          <a:effectLst/>
-                          <a:latin typeface="+mn-lt"/>
-                          <a:ea typeface="+mn-ea"/>
-                          <a:cs typeface="+mn-cs"/>
-                        </a:rPr>
-                        <a:t>Software Design</a:t>
-                      </a:r>
-                    </a:p>
-                  </a:txBody>
-                  <a:tcPr/>
-                </a:tc>
-                <a:tc>
-                  <a:txBody>
-                    <a:bodyPr/>
-                    <a:lstStyle/>
-                    <a:p>
-                      <a:pPr>
-                        <a:lnSpc>
-                          <a:spcPct val="100000"/>
-                        </a:lnSpc>
-                      </a:pPr>
-                      <a:r>
-                        <a:rPr lang="en-US" sz="1800" dirty="0">
-                          <a:latin typeface="+mn-lt"/>
-                        </a:rPr>
-                        <a:t>Anshu Dubey, ANL</a:t>
-                      </a:r>
-                    </a:p>
-                  </a:txBody>
-                  <a:tcPr/>
-                </a:tc>
-                <a:extLst>
-                  <a:ext uri="{0D108BD9-81ED-4DB2-BD59-A6C34878D82A}">
-                    <a16:rowId xmlns:a16="http://schemas.microsoft.com/office/drawing/2014/main" val="2444169840"/>
-                  </a:ext>
-                </a:extLst>
-              </a:tr>
-              <a:tr h="370840">
-                <a:tc>
-                  <a:txBody>
-                    <a:bodyPr/>
-                    <a:lstStyle/>
-                    <a:p>
-                      <a:pPr rtl="0" fontAlgn="t">
-                        <a:spcBef>
-                          <a:spcPts val="0"/>
-                        </a:spcBef>
-                        <a:spcAft>
-                          <a:spcPts val="0"/>
-                        </a:spcAft>
-                      </a:pPr>
-                      <a:r>
                         <a:rPr lang="en-US" sz="1800" dirty="0">
                           <a:effectLst/>
                           <a:latin typeface="+mn-lt"/>
                         </a:rPr>
-                        <a:t>3:00pm-3:15pm</a:t>
+                        <a:t>3:00pm-3:25pm</a:t>
                       </a:r>
                     </a:p>
                   </a:txBody>
@@ -14076,7 +13607,7 @@
                         <a:rPr lang="en-US" sz="1800" i="0" dirty="0">
                           <a:latin typeface="+mn-lt"/>
                         </a:rPr>
-                        <a:t>06</a:t>
+                        <a:t>03</a:t>
                       </a:r>
                     </a:p>
                   </a:txBody>
@@ -14125,13 +13656,10 @@
                         <a:defRPr/>
                       </a:pPr>
                       <a:r>
-                        <a:rPr lang="en-US" sz="1800" i="0" dirty="0">
-                          <a:solidFill>
-                            <a:schemeClr val="tx1"/>
-                          </a:solidFill>
+                        <a:rPr lang="en-US" sz="1800" dirty="0">
                           <a:latin typeface="+mn-lt"/>
                         </a:rPr>
-                        <a:t>David M. Rogers</a:t>
+                        <a:t>David E. Bernholdt, ORNL</a:t>
                       </a:r>
                     </a:p>
                   </a:txBody>
@@ -14162,7 +13690,7 @@
                           <a:effectLst/>
                           <a:latin typeface="+mn-lt"/>
                         </a:rPr>
-                        <a:t>3:15pm-3:40pm</a:t>
+                        <a:t>3:25pm-3:55pm</a:t>
                       </a:r>
                     </a:p>
                   </a:txBody>
@@ -14182,7 +13710,7 @@
                         <a:rPr lang="en-US" sz="1800" i="0" dirty="0">
                           <a:latin typeface="+mn-lt"/>
                         </a:rPr>
-                        <a:t>07</a:t>
+                        <a:t>04</a:t>
                       </a:r>
                     </a:p>
                   </a:txBody>
@@ -14202,7 +13730,7 @@
                         <a:rPr lang="en-US" sz="1800" i="0" dirty="0">
                           <a:latin typeface="+mn-lt"/>
                         </a:rPr>
-                        <a:t>Refactoring</a:t>
+                        <a:t>Continuous Integration</a:t>
                       </a:r>
                     </a:p>
                   </a:txBody>
@@ -14222,98 +13750,19 @@
                         <a:rPr lang="en-US" sz="1800" dirty="0">
                           <a:latin typeface="+mn-lt"/>
                         </a:rPr>
-                        <a:t>Anshu Dubey, ANL</a:t>
+                        <a:t>James M. </a:t>
                       </a:r>
-                    </a:p>
-                  </a:txBody>
-                  <a:tcPr/>
-                </a:tc>
-                <a:extLst>
-                  <a:ext uri="{0D108BD9-81ED-4DB2-BD59-A6C34878D82A}">
-                    <a16:rowId xmlns:a16="http://schemas.microsoft.com/office/drawing/2014/main" val="2446830301"/>
-                  </a:ext>
-                </a:extLst>
-              </a:tr>
-              <a:tr h="370840">
-                <a:tc>
-                  <a:txBody>
-                    <a:bodyPr/>
-                    <a:lstStyle/>
-                    <a:p>
-                      <a:pPr rtl="0" fontAlgn="t">
-                        <a:spcBef>
-                          <a:spcPts val="0"/>
-                        </a:spcBef>
-                        <a:spcAft>
-                          <a:spcPts val="0"/>
-                        </a:spcAft>
-                      </a:pPr>
                       <a:r>
-                        <a:rPr lang="en-US" sz="1800" dirty="0">
-                          <a:effectLst/>
+                        <a:rPr lang="en-US" sz="1800" dirty="0" err="1">
                           <a:latin typeface="+mn-lt"/>
                         </a:rPr>
-                        <a:t>3:40pm-3:55pm</a:t>
+                        <a:t>Willenbring</a:t>
                       </a:r>
-                    </a:p>
-                  </a:txBody>
-                  <a:tcPr marL="63500" marR="63500" marT="63500" marB="63500"/>
-                </a:tc>
-                <a:tc>
-                  <a:txBody>
-                    <a:bodyPr/>
-                    <a:lstStyle/>
-                    <a:p>
-                      <a:pPr>
-                        <a:lnSpc>
-                          <a:spcPct val="100000"/>
-                        </a:lnSpc>
-                      </a:pPr>
-                      <a:r>
-                        <a:rPr lang="en-US" sz="1800" i="0" dirty="0">
-                          <a:latin typeface="+mn-lt"/>
-                        </a:rPr>
-                        <a:t>08</a:t>
-                      </a:r>
-                    </a:p>
-                  </a:txBody>
-                  <a:tcPr/>
-                </a:tc>
-                <a:tc>
-                  <a:txBody>
-                    <a:bodyPr/>
-                    <a:lstStyle/>
-                    <a:p>
-                      <a:pPr>
-                        <a:lnSpc>
-                          <a:spcPct val="100000"/>
-                        </a:lnSpc>
-                      </a:pPr>
-                      <a:r>
-                        <a:rPr lang="en-US" sz="1800" i="0" dirty="0">
-                          <a:latin typeface="+mn-lt"/>
-                        </a:rPr>
-                        <a:t>Reproducibility</a:t>
-                      </a:r>
-                    </a:p>
-                  </a:txBody>
-                  <a:tcPr/>
-                </a:tc>
-                <a:tc>
-                  <a:txBody>
-                    <a:bodyPr/>
-                    <a:lstStyle/>
-                    <a:p>
-                      <a:pPr>
-                        <a:lnSpc>
-                          <a:spcPct val="100000"/>
-                        </a:lnSpc>
-                      </a:pPr>
                       <a:r>
                         <a:rPr lang="en-US" sz="1800" dirty="0">
                           <a:latin typeface="+mn-lt"/>
                         </a:rPr>
-                        <a:t>David E. Bernholdt, ORNL</a:t>
+                        <a:t>, SNL</a:t>
                       </a:r>
                     </a:p>
                   </a:txBody>
@@ -14364,7 +13813,7 @@
                         <a:rPr lang="en-US" sz="1800" i="0" dirty="0">
                           <a:latin typeface="+mn-lt"/>
                         </a:rPr>
-                        <a:t>09</a:t>
+                        <a:t>05</a:t>
                       </a:r>
                     </a:p>
                   </a:txBody>
@@ -14404,7 +13853,19 @@
                         <a:rPr lang="en-US" sz="1800" dirty="0">
                           <a:latin typeface="+mn-lt"/>
                         </a:rPr>
-                        <a:t>David E. Bernholdt, ORNL</a:t>
+                        <a:t>James M. </a:t>
+                      </a:r>
+                      <a:r>
+                        <a:rPr lang="en-US" sz="1800" dirty="0" err="1">
+                          <a:latin typeface="+mn-lt"/>
+                        </a:rPr>
+                        <a:t>Willenbring</a:t>
+                      </a:r>
+                      <a:r>
+                        <a:rPr lang="en-US" sz="1800" dirty="0">
+                          <a:latin typeface="+mn-lt"/>
+                        </a:rPr>
+                        <a:t>, SNL</a:t>
                       </a:r>
                     </a:p>
                   </a:txBody>
@@ -14425,7 +13886,7 @@
           <p:cNvPr id="5" name="Group 4">
             <a:extLst>
               <a:ext uri="{FF2B5EF4-FFF2-40B4-BE49-F238E27FC236}">
-                <a16:creationId xmlns:a16="http://schemas.microsoft.com/office/drawing/2014/main" id="{E481C384-B67A-4E1A-9712-8751F487059D}"/>
+                <a16:creationId xmlns:a16="http://schemas.microsoft.com/office/drawing/2014/main" id="{298E65E2-8CFD-4F26-8DA3-3F5A419B1CCC}"/>
               </a:ext>
             </a:extLst>
           </p:cNvPr>
@@ -14434,7 +13895,7 @@
         </p:nvGrpSpPr>
         <p:grpSpPr>
           <a:xfrm>
-            <a:off x="649538" y="4506322"/>
+            <a:off x="649538" y="2683826"/>
             <a:ext cx="10909739" cy="390939"/>
             <a:chOff x="79513" y="1653208"/>
             <a:chExt cx="12029799" cy="390939"/>
@@ -14445,7 +13906,7 @@
             <p:cNvPr id="6" name="Straight Connector 5">
               <a:extLst>
                 <a:ext uri="{FF2B5EF4-FFF2-40B4-BE49-F238E27FC236}">
-                  <a16:creationId xmlns:a16="http://schemas.microsoft.com/office/drawing/2014/main" id="{81FDDF4F-CEBB-4DB2-B54C-DBAC5A6EF985}"/>
+                  <a16:creationId xmlns:a16="http://schemas.microsoft.com/office/drawing/2014/main" id="{58A6CA20-B55D-4C81-8847-C4C8F5411BA7}"/>
                 </a:ext>
               </a:extLst>
             </p:cNvPr>
@@ -14488,7 +13949,7 @@
             <p:cNvPr id="7" name="Arrow: Right 7">
               <a:extLst>
                 <a:ext uri="{FF2B5EF4-FFF2-40B4-BE49-F238E27FC236}">
-                  <a16:creationId xmlns:a16="http://schemas.microsoft.com/office/drawing/2014/main" id="{7844F343-E894-4FE0-A6FA-018D93AF813D}"/>
+                  <a16:creationId xmlns:a16="http://schemas.microsoft.com/office/drawing/2014/main" id="{15647A8B-7F43-4B40-AF9A-5C49F504C09F}"/>
                 </a:ext>
               </a:extLst>
             </p:cNvPr>
@@ -14563,7 +14024,7 @@
             <p:cNvPr id="8" name="Arrow: Right 8">
               <a:extLst>
                 <a:ext uri="{FF2B5EF4-FFF2-40B4-BE49-F238E27FC236}">
-                  <a16:creationId xmlns:a16="http://schemas.microsoft.com/office/drawing/2014/main" id="{BBFB6C66-6CBA-4D40-8622-561E8F751365}"/>
+                  <a16:creationId xmlns:a16="http://schemas.microsoft.com/office/drawing/2014/main" id="{117F0AD7-F782-4B43-B9F0-67851652A380}"/>
                 </a:ext>
               </a:extLst>
             </p:cNvPr>
@@ -14637,7 +14098,7 @@
     </p:spTree>
     <p:extLst>
       <p:ext uri="{BB962C8B-B14F-4D97-AF65-F5344CB8AC3E}">
-        <p14:creationId xmlns:p14="http://schemas.microsoft.com/office/powerpoint/2010/main" val="1354062058"/>
+        <p14:creationId xmlns:p14="http://schemas.microsoft.com/office/powerpoint/2010/main" val="1214366608"/>
       </p:ext>
     </p:extLst>
   </p:cSld>
@@ -14766,13 +14227,29 @@
             </a:pPr>
             <a:r>
               <a:rPr lang="en-US" sz="1600" b="1" dirty="0"/>
-              <a:t>The requested citation the overall tutorial is: David E. Bernholdt, Anshu Dubey, Rinku K. Gupta, and David M. Rogers, Better Scientific Software tutorial, in Improving Scientific Software conference, online, 2021. DOI: </a:t>
+              <a:t>The requested citation the overall tutorial is: David E. Bernholdt, Patricia A. Grubel, and James M. </a:t>
+            </a:r>
+            <a:r>
+              <a:rPr lang="en-US" sz="1600" b="1" dirty="0" err="1"/>
+              <a:t>Willenbring</a:t>
+            </a:r>
+            <a:r>
+              <a:rPr lang="en-US" sz="1600" b="1" dirty="0"/>
+              <a:t>, Developing a Testing and Continuous Integration Strategy for your Team tutorial, in </a:t>
+            </a:r>
+            <a:r>
+              <a:rPr lang="en-US" sz="1600" b="1" dirty="0" err="1"/>
+              <a:t>Exascale</a:t>
+            </a:r>
+            <a:r>
+              <a:rPr lang="en-US" sz="1600" b="1" dirty="0"/>
+              <a:t> Computing Project Annual Meeting, online, 2021. DOI: </a:t>
             </a:r>
             <a:r>
               <a:rPr lang="en-US" sz="1600" b="1" dirty="0">
                 <a:hlinkClick r:id="rId4"/>
               </a:rPr>
-              <a:t>10.6084/m9.figshare.14256257</a:t>
+              <a:t>10.6084/m9.figshare.14376956</a:t>
             </a:r>
             <a:endParaRPr lang="en-US" sz="1600" b="1" dirty="0"/>
           </a:p>
@@ -14815,15 +14292,7 @@
             </a:pPr>
             <a:r>
               <a:rPr lang="en-US" sz="1400" dirty="0"/>
-              <a:t>Additional contributors include: Mike </a:t>
-            </a:r>
-            <a:r>
-              <a:rPr lang="en-US" sz="1400" dirty="0" err="1"/>
-              <a:t>Heroux</a:t>
-            </a:r>
-            <a:r>
-              <a:rPr lang="en-US" sz="1400" dirty="0"/>
-              <a:t>, Alicia </a:t>
+              <a:t>Additional contributors include: David E. Bernholdt, Anshu Dubey, Rinku K. Gupta, Mike Heroux, Alicia </a:t>
             </a:r>
             <a:r>
               <a:rPr lang="en-US" sz="1400" dirty="0" err="1"/>
@@ -14978,7 +14447,7 @@
     </p:spTree>
     <p:extLst>
       <p:ext uri="{BB962C8B-B14F-4D97-AF65-F5344CB8AC3E}">
-        <p14:creationId xmlns:p14="http://schemas.microsoft.com/office/powerpoint/2010/main" val="978726433"/>
+        <p14:creationId xmlns:p14="http://schemas.microsoft.com/office/powerpoint/2010/main" val="4277464683"/>
       </p:ext>
     </p:extLst>
   </p:cSld>
@@ -15671,11 +15140,11 @@
   <p:clrMapOvr>
     <a:masterClrMapping/>
   </p:clrMapOvr>
-  <mc:AlternateContent xmlns:mc="http://schemas.openxmlformats.org/markup-compatibility/2006">
-    <mc:Choice xmlns:p14="http://schemas.microsoft.com/office/powerpoint/2010/main" Requires="p14">
+  <mc:AlternateContent xmlns:mc="http://schemas.openxmlformats.org/markup-compatibility/2006" xmlns:p14="http://schemas.microsoft.com/office/powerpoint/2010/main">
+    <mc:Choice Requires="p14">
       <p:transition spd="slow" p14:dur="2000" advTm="120709"/>
     </mc:Choice>
-    <mc:Fallback>
+    <mc:Fallback xmlns="">
       <p:transition spd="slow" advTm="120709"/>
     </mc:Fallback>
   </mc:AlternateContent>
@@ -17374,7 +16843,7 @@
           <a:noFill/>
           <a:extLst>
             <a:ext uri="{909E8E84-426E-40dd-AFC4-6F175D3DCCD1}">
-              <a14:hiddenFill xmlns="" xmlns:a14="http://schemas.microsoft.com/office/drawing/2010/main">
+              <a14:hiddenFill xmlns:a14="http://schemas.microsoft.com/office/drawing/2010/main" xmlns="">
                 <a:solidFill>
                   <a:srgbClr val="FFFFFF"/>
                 </a:solidFill>
@@ -18967,18 +18436,18 @@
 </file>
 
 <file path=customXml/item1.xml><?xml version="1.0" encoding="utf-8"?>
-<p:properties xmlns:p="http://schemas.microsoft.com/office/2006/metadata/properties" xmlns:xsi="http://www.w3.org/2001/XMLSchema-instance" xmlns:pc="http://schemas.microsoft.com/office/infopath/2007/PartnerControls">
-  <documentManagement/>
-</p:properties>
-</file>
-
-<file path=customXml/item2.xml><?xml version="1.0" encoding="utf-8"?>
 <?mso-contentType ?>
 <FormTemplates xmlns="http://schemas.microsoft.com/sharepoint/v3/contenttype/forms">
   <Display>DocumentLibraryForm</Display>
   <Edit>DocumentLibraryForm</Edit>
   <New>DocumentLibraryForm</New>
 </FormTemplates>
+</file>
+
+<file path=customXml/item2.xml><?xml version="1.0" encoding="utf-8"?>
+<p:properties xmlns:p="http://schemas.microsoft.com/office/2006/metadata/properties" xmlns:xsi="http://www.w3.org/2001/XMLSchema-instance" xmlns:pc="http://schemas.microsoft.com/office/infopath/2007/PartnerControls">
+  <documentManagement/>
+</p:properties>
 </file>
 
 <file path=customXml/item3.xml><?xml version="1.0" encoding="utf-8"?>
@@ -19031,6 +18500,14 @@
 </file>
 
 <file path=customXml/itemProps1.xml><?xml version="1.0" encoding="utf-8"?>
+<ds:datastoreItem xmlns:ds="http://schemas.openxmlformats.org/officeDocument/2006/customXml" ds:itemID="{19E20559-B232-4371-8690-E3D8007EDB82}">
+  <ds:schemaRefs>
+    <ds:schemaRef ds:uri="http://schemas.microsoft.com/sharepoint/v3/contenttype/forms"/>
+  </ds:schemaRefs>
+</ds:datastoreItem>
+</file>
+
+<file path=customXml/itemProps2.xml><?xml version="1.0" encoding="utf-8"?>
 <ds:datastoreItem xmlns:ds="http://schemas.openxmlformats.org/officeDocument/2006/customXml" ds:itemID="{A50EC660-24D0-43A0-AE5E-E274115E726B}">
   <ds:schemaRefs>
     <ds:schemaRef ds:uri="http://purl.org/dc/terms/"/>
@@ -19041,14 +18518,6 @@
     <ds:schemaRef ds:uri="http://www.w3.org/XML/1998/namespace"/>
     <ds:schemaRef ds:uri="http://purl.org/dc/dcmitype/"/>
     <ds:schemaRef ds:uri="http://schemas.microsoft.com/office/infopath/2007/PartnerControls"/>
-  </ds:schemaRefs>
-</ds:datastoreItem>
-</file>
-
-<file path=customXml/itemProps2.xml><?xml version="1.0" encoding="utf-8"?>
-<ds:datastoreItem xmlns:ds="http://schemas.openxmlformats.org/officeDocument/2006/customXml" ds:itemID="{19E20559-B232-4371-8690-E3D8007EDB82}">
-  <ds:schemaRefs>
-    <ds:schemaRef ds:uri="http://schemas.microsoft.com/sharepoint/v3/contenttype/forms"/>
   </ds:schemaRefs>
 </ds:datastoreItem>
 </file>

</xml_diff>